<commit_message>
Added ASP.NET porting slides
</commit_message>
<xml_diff>
--- a/4-Porting-From-NET-Framework/netcore-workshop-porting.pptx
+++ b/4-Porting-From-NET-Framework/netcore-workshop-porting.pptx
@@ -6,10 +6,10 @@
     <p:sldMasterId id="2147484565" r:id="rId5"/>
   </p:sldMasterIdLst>
   <p:notesMasterIdLst>
-    <p:notesMasterId r:id="rId12"/>
+    <p:notesMasterId r:id="rId14"/>
   </p:notesMasterIdLst>
   <p:handoutMasterIdLst>
-    <p:handoutMasterId r:id="rId13"/>
+    <p:handoutMasterId r:id="rId15"/>
   </p:handoutMasterIdLst>
   <p:sldIdLst>
     <p:sldId id="1393" r:id="rId6"/>
@@ -18,6 +18,8 @@
     <p:sldId id="1396" r:id="rId9"/>
     <p:sldId id="1397" r:id="rId10"/>
     <p:sldId id="1398" r:id="rId11"/>
+    <p:sldId id="1399" r:id="rId12"/>
+    <p:sldId id="1400" r:id="rId13"/>
   </p:sldIdLst>
   <p:sldSz cx="12436475" cy="6994525"/>
   <p:notesSz cx="6858000" cy="9144000"/>
@@ -127,6 +129,8 @@
             <p14:sldId id="1396"/>
             <p14:sldId id="1397"/>
             <p14:sldId id="1398"/>
+            <p14:sldId id="1399"/>
+            <p14:sldId id="1400"/>
           </p14:sldIdLst>
         </p14:section>
       </p14:sectionLst>
@@ -258,7 +262,7 @@
               <a:rPr lang="en-US" smtClean="0">
                 <a:latin typeface="Segoe UI" pitchFamily="34" charset="0"/>
               </a:rPr>
-              <a:t>5/5/2017 12:09 AM</a:t>
+              <a:t>5/9/2017 1:16 PM</a:t>
             </a:fld>
             <a:endParaRPr lang="en-US" dirty="0">
               <a:latin typeface="Segoe UI" pitchFamily="34" charset="0"/>
@@ -539,7 +543,7 @@
           <a:p>
             <a:fld id="{38EEC551-8CDA-4EB6-89BB-2A86C9F091C8}" type="datetime8">
               <a:rPr lang="en-US" smtClean="0"/>
-              <a:t>5/5/2017 12:09 AM</a:t>
+              <a:t>5/9/2017 1:16 PM</a:t>
             </a:fld>
             <a:endParaRPr lang="en-US" dirty="0"/>
           </a:p>
@@ -926,7 +930,7 @@
           <a:p>
             <a:fld id="{38EEC551-8CDA-4EB6-89BB-2A86C9F091C8}" type="datetime8">
               <a:rPr lang="en-US" smtClean="0"/>
-              <a:t>5/5/2017 12:09 AM</a:t>
+              <a:t>5/9/2017 1:16 PM</a:t>
             </a:fld>
             <a:endParaRPr lang="en-US" dirty="0"/>
           </a:p>
@@ -1111,7 +1115,7 @@
           <a:p>
             <a:fld id="{38EEC551-8CDA-4EB6-89BB-2A86C9F091C8}" type="datetime8">
               <a:rPr lang="en-US" smtClean="0"/>
-              <a:t>5/5/2017 12:11 AM</a:t>
+              <a:t>5/9/2017 1:16 PM</a:t>
             </a:fld>
             <a:endParaRPr lang="en-US" dirty="0"/>
           </a:p>
@@ -1296,7 +1300,7 @@
           <a:p>
             <a:fld id="{38EEC551-8CDA-4EB6-89BB-2A86C9F091C8}" type="datetime8">
               <a:rPr lang="en-US" smtClean="0"/>
-              <a:t>5/5/2017 1:21 AM</a:t>
+              <a:t>5/9/2017 1:16 PM</a:t>
             </a:fld>
             <a:endParaRPr lang="en-US" dirty="0"/>
           </a:p>
@@ -1481,7 +1485,7 @@
           <a:p>
             <a:fld id="{38EEC551-8CDA-4EB6-89BB-2A86C9F091C8}" type="datetime8">
               <a:rPr lang="en-US" smtClean="0"/>
-              <a:t>5/5/2017 1:22 AM</a:t>
+              <a:t>5/9/2017 1:16 PM</a:t>
             </a:fld>
             <a:endParaRPr lang="en-US" dirty="0"/>
           </a:p>
@@ -1666,7 +1670,7 @@
           <a:p>
             <a:fld id="{38EEC551-8CDA-4EB6-89BB-2A86C9F091C8}" type="datetime8">
               <a:rPr lang="en-US" smtClean="0"/>
-              <a:t>5/5/2017 1:26 AM</a:t>
+              <a:t>5/9/2017 1:16 PM</a:t>
             </a:fld>
             <a:endParaRPr lang="en-US" dirty="0"/>
           </a:p>
@@ -1851,7 +1855,7 @@
           <a:p>
             <a:fld id="{38EEC551-8CDA-4EB6-89BB-2A86C9F091C8}" type="datetime8">
               <a:rPr lang="en-US" smtClean="0"/>
-              <a:t>5/5/2017 1:26 AM</a:t>
+              <a:t>5/9/2017 1:16 PM</a:t>
             </a:fld>
             <a:endParaRPr lang="en-US" dirty="0"/>
           </a:p>
@@ -1885,6 +1889,376 @@
     <p:extLst>
       <p:ext uri="{BB962C8B-B14F-4D97-AF65-F5344CB8AC3E}">
         <p14:creationId xmlns:p14="http://schemas.microsoft.com/office/powerpoint/2010/main" val="97638035"/>
+      </p:ext>
+    </p:extLst>
+  </p:cSld>
+  <p:clrMapOvr>
+    <a:masterClrMapping/>
+  </p:clrMapOvr>
+</p:notes>
+</file>
+
+<file path=ppt/notesSlides/notesSlide7.xml><?xml version="1.0" encoding="utf-8"?>
+<p:notes xmlns:a="http://schemas.openxmlformats.org/drawingml/2006/main" xmlns:r="http://schemas.openxmlformats.org/officeDocument/2006/relationships" xmlns:p="http://schemas.openxmlformats.org/presentationml/2006/main">
+  <p:cSld>
+    <p:spTree>
+      <p:nvGrpSpPr>
+        <p:cNvPr id="1" name=""/>
+        <p:cNvGrpSpPr/>
+        <p:nvPr/>
+      </p:nvGrpSpPr>
+      <p:grpSpPr>
+        <a:xfrm>
+          <a:off x="0" y="0"/>
+          <a:ext cx="0" cy="0"/>
+          <a:chOff x="0" y="0"/>
+          <a:chExt cx="0" cy="0"/>
+        </a:xfrm>
+      </p:grpSpPr>
+      <p:sp>
+        <p:nvSpPr>
+          <p:cNvPr id="2" name="Slide Image Placeholder 1"/>
+          <p:cNvSpPr>
+            <a:spLocks noGrp="1" noRot="1" noChangeAspect="1"/>
+          </p:cNvSpPr>
+          <p:nvPr>
+            <p:ph type="sldImg"/>
+          </p:nvPr>
+        </p:nvSpPr>
+        <p:spPr/>
+      </p:sp>
+      <p:sp>
+        <p:nvSpPr>
+          <p:cNvPr id="3" name="Notes Placeholder 2"/>
+          <p:cNvSpPr>
+            <a:spLocks noGrp="1"/>
+          </p:cNvSpPr>
+          <p:nvPr>
+            <p:ph type="body" idx="1"/>
+          </p:nvPr>
+        </p:nvSpPr>
+        <p:spPr/>
+        <p:txBody>
+          <a:bodyPr/>
+          <a:lstStyle/>
+          <a:p>
+            <a:endParaRPr lang="en-US" dirty="0"/>
+          </a:p>
+        </p:txBody>
+      </p:sp>
+      <p:sp>
+        <p:nvSpPr>
+          <p:cNvPr id="4" name="Header Placeholder 3"/>
+          <p:cNvSpPr>
+            <a:spLocks noGrp="1"/>
+          </p:cNvSpPr>
+          <p:nvPr>
+            <p:ph type="hdr" sz="quarter" idx="10"/>
+          </p:nvPr>
+        </p:nvSpPr>
+        <p:spPr/>
+        <p:txBody>
+          <a:bodyPr/>
+          <a:lstStyle/>
+          <a:p>
+            <a:r>
+              <a:rPr lang="en-US"/>
+              <a:t>Microsoft Ignite 2016</a:t>
+            </a:r>
+            <a:endParaRPr lang="en-US" dirty="0"/>
+          </a:p>
+        </p:txBody>
+      </p:sp>
+      <p:sp>
+        <p:nvSpPr>
+          <p:cNvPr id="5" name="Footer Placeholder 4"/>
+          <p:cNvSpPr>
+            <a:spLocks noGrp="1"/>
+          </p:cNvSpPr>
+          <p:nvPr>
+            <p:ph type="ftr" sz="quarter" idx="11"/>
+          </p:nvPr>
+        </p:nvSpPr>
+        <p:spPr/>
+        <p:txBody>
+          <a:bodyPr/>
+          <a:lstStyle/>
+          <a:p>
+            <a:pPr defTabSz="914099" eaLnBrk="0" hangingPunct="0"/>
+            <a:r>
+              <a:rPr lang="en-US" sz="400">
+                <a:gradFill>
+                  <a:gsLst>
+                    <a:gs pos="0">
+                      <a:prstClr val="black"/>
+                    </a:gs>
+                    <a:gs pos="100000">
+                      <a:prstClr val="black"/>
+                    </a:gs>
+                  </a:gsLst>
+                  <a:lin ang="5400000" scaled="0"/>
+                </a:gradFill>
+                <a:latin typeface="Segoe UI" pitchFamily="34" charset="0"/>
+                <a:ea typeface="Segoe UI" pitchFamily="34" charset="0"/>
+                <a:cs typeface="Segoe UI" pitchFamily="34" charset="0"/>
+              </a:rPr>
+              <a:t>© 2016 Microsoft Corporation. All rights reserved. MICROSOFT MAKES NO WARRANTIES, EXPRESS, IMPLIED OR STATUTORY, AS TO THE INFORMATION IN THIS PRESENTATION.</a:t>
+            </a:r>
+            <a:endParaRPr lang="en-US" sz="400" dirty="0">
+              <a:gradFill>
+                <a:gsLst>
+                  <a:gs pos="0">
+                    <a:prstClr val="black"/>
+                  </a:gs>
+                  <a:gs pos="100000">
+                    <a:prstClr val="black"/>
+                  </a:gs>
+                </a:gsLst>
+                <a:lin ang="5400000" scaled="0"/>
+              </a:gradFill>
+              <a:latin typeface="Segoe UI" pitchFamily="34" charset="0"/>
+              <a:ea typeface="Segoe UI" pitchFamily="34" charset="0"/>
+              <a:cs typeface="Segoe UI" pitchFamily="34" charset="0"/>
+            </a:endParaRPr>
+          </a:p>
+        </p:txBody>
+      </p:sp>
+      <p:sp>
+        <p:nvSpPr>
+          <p:cNvPr id="6" name="Date Placeholder 5"/>
+          <p:cNvSpPr>
+            <a:spLocks noGrp="1"/>
+          </p:cNvSpPr>
+          <p:nvPr>
+            <p:ph type="dt" idx="12"/>
+          </p:nvPr>
+        </p:nvSpPr>
+        <p:spPr/>
+        <p:txBody>
+          <a:bodyPr/>
+          <a:lstStyle/>
+          <a:p>
+            <a:fld id="{38EEC551-8CDA-4EB6-89BB-2A86C9F091C8}" type="datetime8">
+              <a:rPr lang="en-US" smtClean="0"/>
+              <a:t>5/9/2017 1:16 PM</a:t>
+            </a:fld>
+            <a:endParaRPr lang="en-US" dirty="0"/>
+          </a:p>
+        </p:txBody>
+      </p:sp>
+      <p:sp>
+        <p:nvSpPr>
+          <p:cNvPr id="7" name="Slide Number Placeholder 6"/>
+          <p:cNvSpPr>
+            <a:spLocks noGrp="1"/>
+          </p:cNvSpPr>
+          <p:nvPr>
+            <p:ph type="sldNum" sz="quarter" idx="13"/>
+          </p:nvPr>
+        </p:nvSpPr>
+        <p:spPr/>
+        <p:txBody>
+          <a:bodyPr/>
+          <a:lstStyle/>
+          <a:p>
+            <a:fld id="{B4008EB6-D09E-4580-8CD6-DDB14511944F}" type="slidenum">
+              <a:rPr lang="en-US" smtClean="0"/>
+              <a:pPr/>
+              <a:t>7</a:t>
+            </a:fld>
+            <a:endParaRPr lang="en-US" dirty="0"/>
+          </a:p>
+        </p:txBody>
+      </p:sp>
+    </p:spTree>
+    <p:extLst>
+      <p:ext uri="{BB962C8B-B14F-4D97-AF65-F5344CB8AC3E}">
+        <p14:creationId xmlns:p14="http://schemas.microsoft.com/office/powerpoint/2010/main" val="293645291"/>
+      </p:ext>
+    </p:extLst>
+  </p:cSld>
+  <p:clrMapOvr>
+    <a:masterClrMapping/>
+  </p:clrMapOvr>
+</p:notes>
+</file>
+
+<file path=ppt/notesSlides/notesSlide8.xml><?xml version="1.0" encoding="utf-8"?>
+<p:notes xmlns:a="http://schemas.openxmlformats.org/drawingml/2006/main" xmlns:r="http://schemas.openxmlformats.org/officeDocument/2006/relationships" xmlns:p="http://schemas.openxmlformats.org/presentationml/2006/main">
+  <p:cSld>
+    <p:spTree>
+      <p:nvGrpSpPr>
+        <p:cNvPr id="1" name=""/>
+        <p:cNvGrpSpPr/>
+        <p:nvPr/>
+      </p:nvGrpSpPr>
+      <p:grpSpPr>
+        <a:xfrm>
+          <a:off x="0" y="0"/>
+          <a:ext cx="0" cy="0"/>
+          <a:chOff x="0" y="0"/>
+          <a:chExt cx="0" cy="0"/>
+        </a:xfrm>
+      </p:grpSpPr>
+      <p:sp>
+        <p:nvSpPr>
+          <p:cNvPr id="2" name="Slide Image Placeholder 1"/>
+          <p:cNvSpPr>
+            <a:spLocks noGrp="1" noRot="1" noChangeAspect="1"/>
+          </p:cNvSpPr>
+          <p:nvPr>
+            <p:ph type="sldImg"/>
+          </p:nvPr>
+        </p:nvSpPr>
+        <p:spPr/>
+      </p:sp>
+      <p:sp>
+        <p:nvSpPr>
+          <p:cNvPr id="3" name="Notes Placeholder 2"/>
+          <p:cNvSpPr>
+            <a:spLocks noGrp="1"/>
+          </p:cNvSpPr>
+          <p:nvPr>
+            <p:ph type="body" idx="1"/>
+          </p:nvPr>
+        </p:nvSpPr>
+        <p:spPr/>
+        <p:txBody>
+          <a:bodyPr/>
+          <a:lstStyle/>
+          <a:p>
+            <a:endParaRPr lang="en-US" dirty="0"/>
+          </a:p>
+        </p:txBody>
+      </p:sp>
+      <p:sp>
+        <p:nvSpPr>
+          <p:cNvPr id="4" name="Header Placeholder 3"/>
+          <p:cNvSpPr>
+            <a:spLocks noGrp="1"/>
+          </p:cNvSpPr>
+          <p:nvPr>
+            <p:ph type="hdr" sz="quarter" idx="10"/>
+          </p:nvPr>
+        </p:nvSpPr>
+        <p:spPr/>
+        <p:txBody>
+          <a:bodyPr/>
+          <a:lstStyle/>
+          <a:p>
+            <a:r>
+              <a:rPr lang="en-US"/>
+              <a:t>Microsoft Ignite 2016</a:t>
+            </a:r>
+            <a:endParaRPr lang="en-US" dirty="0"/>
+          </a:p>
+        </p:txBody>
+      </p:sp>
+      <p:sp>
+        <p:nvSpPr>
+          <p:cNvPr id="5" name="Footer Placeholder 4"/>
+          <p:cNvSpPr>
+            <a:spLocks noGrp="1"/>
+          </p:cNvSpPr>
+          <p:nvPr>
+            <p:ph type="ftr" sz="quarter" idx="11"/>
+          </p:nvPr>
+        </p:nvSpPr>
+        <p:spPr/>
+        <p:txBody>
+          <a:bodyPr/>
+          <a:lstStyle/>
+          <a:p>
+            <a:pPr defTabSz="914099" eaLnBrk="0" hangingPunct="0"/>
+            <a:r>
+              <a:rPr lang="en-US" sz="400">
+                <a:gradFill>
+                  <a:gsLst>
+                    <a:gs pos="0">
+                      <a:prstClr val="black"/>
+                    </a:gs>
+                    <a:gs pos="100000">
+                      <a:prstClr val="black"/>
+                    </a:gs>
+                  </a:gsLst>
+                  <a:lin ang="5400000" scaled="0"/>
+                </a:gradFill>
+                <a:latin typeface="Segoe UI" pitchFamily="34" charset="0"/>
+                <a:ea typeface="Segoe UI" pitchFamily="34" charset="0"/>
+                <a:cs typeface="Segoe UI" pitchFamily="34" charset="0"/>
+              </a:rPr>
+              <a:t>© 2016 Microsoft Corporation. All rights reserved. MICROSOFT MAKES NO WARRANTIES, EXPRESS, IMPLIED OR STATUTORY, AS TO THE INFORMATION IN THIS PRESENTATION.</a:t>
+            </a:r>
+            <a:endParaRPr lang="en-US" sz="400" dirty="0">
+              <a:gradFill>
+                <a:gsLst>
+                  <a:gs pos="0">
+                    <a:prstClr val="black"/>
+                  </a:gs>
+                  <a:gs pos="100000">
+                    <a:prstClr val="black"/>
+                  </a:gs>
+                </a:gsLst>
+                <a:lin ang="5400000" scaled="0"/>
+              </a:gradFill>
+              <a:latin typeface="Segoe UI" pitchFamily="34" charset="0"/>
+              <a:ea typeface="Segoe UI" pitchFamily="34" charset="0"/>
+              <a:cs typeface="Segoe UI" pitchFamily="34" charset="0"/>
+            </a:endParaRPr>
+          </a:p>
+        </p:txBody>
+      </p:sp>
+      <p:sp>
+        <p:nvSpPr>
+          <p:cNvPr id="6" name="Date Placeholder 5"/>
+          <p:cNvSpPr>
+            <a:spLocks noGrp="1"/>
+          </p:cNvSpPr>
+          <p:nvPr>
+            <p:ph type="dt" idx="12"/>
+          </p:nvPr>
+        </p:nvSpPr>
+        <p:spPr/>
+        <p:txBody>
+          <a:bodyPr/>
+          <a:lstStyle/>
+          <a:p>
+            <a:fld id="{38EEC551-8CDA-4EB6-89BB-2A86C9F091C8}" type="datetime8">
+              <a:rPr lang="en-US" smtClean="0"/>
+              <a:t>5/9/2017 1:26 PM</a:t>
+            </a:fld>
+            <a:endParaRPr lang="en-US" dirty="0"/>
+          </a:p>
+        </p:txBody>
+      </p:sp>
+      <p:sp>
+        <p:nvSpPr>
+          <p:cNvPr id="7" name="Slide Number Placeholder 6"/>
+          <p:cNvSpPr>
+            <a:spLocks noGrp="1"/>
+          </p:cNvSpPr>
+          <p:nvPr>
+            <p:ph type="sldNum" sz="quarter" idx="13"/>
+          </p:nvPr>
+        </p:nvSpPr>
+        <p:spPr/>
+        <p:txBody>
+          <a:bodyPr/>
+          <a:lstStyle/>
+          <a:p>
+            <a:fld id="{B4008EB6-D09E-4580-8CD6-DDB14511944F}" type="slidenum">
+              <a:rPr lang="en-US" smtClean="0"/>
+              <a:pPr/>
+              <a:t>8</a:t>
+            </a:fld>
+            <a:endParaRPr lang="en-US" dirty="0"/>
+          </a:p>
+        </p:txBody>
+      </p:sp>
+    </p:spTree>
+    <p:extLst>
+      <p:ext uri="{BB962C8B-B14F-4D97-AF65-F5344CB8AC3E}">
+        <p14:creationId xmlns:p14="http://schemas.microsoft.com/office/powerpoint/2010/main" val="1662646175"/>
       </p:ext>
     </p:extLst>
   </p:cSld>
@@ -5992,6 +6366,257 @@
 </p:sld>
 </file>
 
+<file path=ppt/slides/slide7.xml><?xml version="1.0" encoding="utf-8"?>
+<p:sld xmlns:a="http://schemas.openxmlformats.org/drawingml/2006/main" xmlns:r="http://schemas.openxmlformats.org/officeDocument/2006/relationships" xmlns:p="http://schemas.openxmlformats.org/presentationml/2006/main">
+  <p:cSld>
+    <p:spTree>
+      <p:nvGrpSpPr>
+        <p:cNvPr id="1" name=""/>
+        <p:cNvGrpSpPr/>
+        <p:nvPr/>
+      </p:nvGrpSpPr>
+      <p:grpSpPr>
+        <a:xfrm>
+          <a:off x="0" y="0"/>
+          <a:ext cx="0" cy="0"/>
+          <a:chOff x="0" y="0"/>
+          <a:chExt cx="0" cy="0"/>
+        </a:xfrm>
+      </p:grpSpPr>
+      <p:sp>
+        <p:nvSpPr>
+          <p:cNvPr id="2" name="Title 1"/>
+          <p:cNvSpPr>
+            <a:spLocks noGrp="1"/>
+          </p:cNvSpPr>
+          <p:nvPr>
+            <p:ph type="title"/>
+          </p:nvPr>
+        </p:nvSpPr>
+        <p:spPr/>
+        <p:txBody>
+          <a:bodyPr/>
+          <a:lstStyle/>
+          <a:p>
+            <a:r>
+              <a:rPr lang="en-US" dirty="0"/>
+              <a:t>ASP.NET Considerations</a:t>
+            </a:r>
+          </a:p>
+        </p:txBody>
+      </p:sp>
+      <p:sp>
+        <p:nvSpPr>
+          <p:cNvPr id="3" name="Text Placeholder 2"/>
+          <p:cNvSpPr>
+            <a:spLocks noGrp="1"/>
+          </p:cNvSpPr>
+          <p:nvPr>
+            <p:ph type="body" sz="quarter" idx="10"/>
+          </p:nvPr>
+        </p:nvSpPr>
+        <p:spPr>
+          <a:xfrm>
+            <a:off x="274702" y="1211287"/>
+            <a:ext cx="11888787" cy="4665893"/>
+          </a:xfrm>
+        </p:spPr>
+        <p:txBody>
+          <a:bodyPr/>
+          <a:lstStyle/>
+          <a:p>
+            <a:r>
+              <a:rPr lang="en-US" sz="4000" dirty="0"/>
+              <a:t>Modules / Handlers</a:t>
+            </a:r>
+          </a:p>
+          <a:p>
+            <a:r>
+              <a:rPr lang="en-US" sz="4000" dirty="0"/>
+              <a:t>Startup / Configuration</a:t>
+            </a:r>
+          </a:p>
+          <a:p>
+            <a:r>
+              <a:rPr lang="en-US" sz="4000" dirty="0"/>
+              <a:t>Front-end (static) files</a:t>
+            </a:r>
+          </a:p>
+          <a:p>
+            <a:r>
+              <a:rPr lang="en-US" sz="4000" dirty="0"/>
+              <a:t>Identity</a:t>
+            </a:r>
+          </a:p>
+          <a:p>
+            <a:r>
+              <a:rPr lang="en-US" sz="4000" dirty="0"/>
+              <a:t>Entity Framework (migrations, etc.)</a:t>
+            </a:r>
+          </a:p>
+          <a:p>
+            <a:r>
+              <a:rPr lang="en-US" sz="4000" dirty="0"/>
+              <a:t>Tool: Routing</a:t>
+            </a:r>
+          </a:p>
+          <a:p>
+            <a:endParaRPr lang="en-US" sz="3200" dirty="0"/>
+          </a:p>
+        </p:txBody>
+      </p:sp>
+    </p:spTree>
+    <p:extLst>
+      <p:ext uri="{BB962C8B-B14F-4D97-AF65-F5344CB8AC3E}">
+        <p14:creationId xmlns:p14="http://schemas.microsoft.com/office/powerpoint/2010/main" val="2204738350"/>
+      </p:ext>
+    </p:extLst>
+  </p:cSld>
+  <p:clrMapOvr>
+    <a:masterClrMapping/>
+  </p:clrMapOvr>
+  <p:transition>
+    <p:fade/>
+  </p:transition>
+</p:sld>
+</file>
+
+<file path=ppt/slides/slide8.xml><?xml version="1.0" encoding="utf-8"?>
+<p:sld xmlns:a="http://schemas.openxmlformats.org/drawingml/2006/main" xmlns:r="http://schemas.openxmlformats.org/officeDocument/2006/relationships" xmlns:p="http://schemas.openxmlformats.org/presentationml/2006/main">
+  <p:cSld>
+    <p:spTree>
+      <p:nvGrpSpPr>
+        <p:cNvPr id="1" name=""/>
+        <p:cNvGrpSpPr/>
+        <p:nvPr/>
+      </p:nvGrpSpPr>
+      <p:grpSpPr>
+        <a:xfrm>
+          <a:off x="0" y="0"/>
+          <a:ext cx="0" cy="0"/>
+          <a:chOff x="0" y="0"/>
+          <a:chExt cx="0" cy="0"/>
+        </a:xfrm>
+      </p:grpSpPr>
+      <p:sp>
+        <p:nvSpPr>
+          <p:cNvPr id="2" name="Title 1"/>
+          <p:cNvSpPr>
+            <a:spLocks noGrp="1"/>
+          </p:cNvSpPr>
+          <p:nvPr>
+            <p:ph type="title"/>
+          </p:nvPr>
+        </p:nvSpPr>
+        <p:spPr/>
+        <p:txBody>
+          <a:bodyPr/>
+          <a:lstStyle/>
+          <a:p>
+            <a:r>
+              <a:rPr lang="en-US" dirty="0"/>
+              <a:t>Steps</a:t>
+            </a:r>
+          </a:p>
+        </p:txBody>
+      </p:sp>
+      <p:sp>
+        <p:nvSpPr>
+          <p:cNvPr id="3" name="Text Placeholder 2"/>
+          <p:cNvSpPr>
+            <a:spLocks noGrp="1"/>
+          </p:cNvSpPr>
+          <p:nvPr>
+            <p:ph type="body" sz="quarter" idx="10"/>
+          </p:nvPr>
+        </p:nvSpPr>
+        <p:spPr>
+          <a:xfrm>
+            <a:off x="274702" y="1211287"/>
+            <a:ext cx="11888787" cy="5343001"/>
+          </a:xfrm>
+        </p:spPr>
+        <p:txBody>
+          <a:bodyPr/>
+          <a:lstStyle/>
+          <a:p>
+            <a:r>
+              <a:rPr lang="en-US" sz="4000" dirty="0"/>
+              <a:t>Get ready</a:t>
+            </a:r>
+          </a:p>
+          <a:p>
+            <a:pPr lvl="1"/>
+            <a:r>
+              <a:rPr lang="en-US" sz="3200" dirty="0"/>
+              <a:t>Learn with a new / internal application</a:t>
+            </a:r>
+          </a:p>
+          <a:p>
+            <a:r>
+              <a:rPr lang="en-US" sz="4000" dirty="0"/>
+              <a:t>Prepare Your Existing Application</a:t>
+            </a:r>
+          </a:p>
+          <a:p>
+            <a:pPr lvl="1"/>
+            <a:r>
+              <a:rPr lang="en-US" sz="3200" dirty="0"/>
+              <a:t>Update to new release / patterns</a:t>
+            </a:r>
+          </a:p>
+          <a:p>
+            <a:pPr lvl="1"/>
+            <a:r>
+              <a:rPr lang="en-US" sz="3200" dirty="0"/>
+              <a:t>Refactor to services</a:t>
+            </a:r>
+          </a:p>
+          <a:p>
+            <a:pPr lvl="1"/>
+            <a:r>
+              <a:rPr lang="en-US" sz="3200" dirty="0"/>
+              <a:t>Test coverage (unit, integration, user interface)</a:t>
+            </a:r>
+          </a:p>
+          <a:p>
+            <a:r>
+              <a:rPr lang="en-US" sz="4000" dirty="0"/>
+              <a:t>Create a New Application</a:t>
+            </a:r>
+          </a:p>
+          <a:p>
+            <a:pPr lvl="1"/>
+            <a:r>
+              <a:rPr lang="en-US" sz="3200" dirty="0"/>
+              <a:t>Select the nearest match</a:t>
+            </a:r>
+          </a:p>
+          <a:p>
+            <a:pPr lvl="1"/>
+            <a:r>
+              <a:rPr lang="en-US" sz="3200" dirty="0"/>
+              <a:t>Copy / reference code</a:t>
+            </a:r>
+          </a:p>
+        </p:txBody>
+      </p:sp>
+    </p:spTree>
+    <p:extLst>
+      <p:ext uri="{BB962C8B-B14F-4D97-AF65-F5344CB8AC3E}">
+        <p14:creationId xmlns:p14="http://schemas.microsoft.com/office/powerpoint/2010/main" val="873442315"/>
+      </p:ext>
+    </p:extLst>
+  </p:cSld>
+  <p:clrMapOvr>
+    <a:masterClrMapping/>
+  </p:clrMapOvr>
+  <p:transition>
+    <p:fade/>
+  </p:transition>
+</p:sld>
+</file>
+
 <file path=ppt/theme/theme1.xml><?xml version="1.0" encoding="utf-8"?>
 <a:theme xmlns:a="http://schemas.openxmlformats.org/drawingml/2006/main" name="5-50111_Build 2017_LIGHT GRAY TEMPLATE">
   <a:themeElements>
@@ -7163,6 +7788,21 @@
 </file>
 
 <file path=customXml/item1.xml><?xml version="1.0" encoding="utf-8"?>
+<p:properties xmlns:p="http://schemas.microsoft.com/office/2006/metadata/properties" xmlns:xsi="http://www.w3.org/2001/XMLSchema-instance" xmlns:pc="http://schemas.microsoft.com/office/infopath/2007/PartnerControls">
+  <documentManagement/>
+</p:properties>
+</file>
+
+<file path=customXml/item2.xml><?xml version="1.0" encoding="utf-8"?>
+<?mso-contentType ?>
+<FormTemplates xmlns="http://schemas.microsoft.com/sharepoint/v3/contenttype/forms">
+  <Display>DocumentLibraryForm</Display>
+  <Edit>DocumentLibraryForm</Edit>
+  <New>DocumentLibraryForm</New>
+</FormTemplates>
+</file>
+
+<file path=customXml/item3.xml><?xml version="1.0" encoding="utf-8"?>
 <ct:contentTypeSchema xmlns:ct="http://schemas.microsoft.com/office/2006/metadata/contentType" xmlns:ma="http://schemas.microsoft.com/office/2006/metadata/properties/metaAttributes" ct:_="" ma:_="" ma:contentTypeName="Document" ma:contentTypeID="0x0101004C8AF336095DB84A94AB1A4B939C0475" ma:contentTypeVersion="4" ma:contentTypeDescription="Create a new document." ma:contentTypeScope="" ma:versionID="6f8327450122d2e4aedd139501eaa58b">
   <xsd:schema xmlns:xsd="http://www.w3.org/2001/XMLSchema" xmlns:xs="http://www.w3.org/2001/XMLSchema" xmlns:p="http://schemas.microsoft.com/office/2006/metadata/properties" xmlns:ns2="29eeffc7-3a1a-4f16-995c-1b7b58342919" targetNamespace="http://schemas.microsoft.com/office/2006/metadata/properties" ma:root="true" ma:fieldsID="7d6c3be25c216b690a82d24b3f2244b5" ns2:_="">
     <xsd:import namespace="29eeffc7-3a1a-4f16-995c-1b7b58342919"/>
@@ -7324,22 +7964,31 @@
 </ct:contentTypeSchema>
 </file>
 
-<file path=customXml/item2.xml><?xml version="1.0" encoding="utf-8"?>
-<?mso-contentType ?>
-<FormTemplates xmlns="http://schemas.microsoft.com/sharepoint/v3/contenttype/forms">
-  <Display>DocumentLibraryForm</Display>
-  <Edit>DocumentLibraryForm</Edit>
-  <New>DocumentLibraryForm</New>
-</FormTemplates>
+<file path=customXml/itemProps1.xml><?xml version="1.0" encoding="utf-8"?>
+<ds:datastoreItem xmlns:ds="http://schemas.openxmlformats.org/officeDocument/2006/customXml" ds:itemID="{F990F116-B58F-4255-B05B-DA3808E0E5C6}">
+  <ds:schemaRefs>
+    <ds:schemaRef ds:uri="http://schemas.microsoft.com/office/2006/metadata/properties"/>
+    <ds:schemaRef ds:uri="29eeffc7-3a1a-4f16-995c-1b7b58342919"/>
+    <ds:schemaRef ds:uri="http://purl.org/dc/terms/"/>
+    <ds:schemaRef ds:uri="http://schemas.openxmlformats.org/package/2006/metadata/core-properties"/>
+    <ds:schemaRef ds:uri="http://purl.org/dc/dcmitype/"/>
+    <ds:schemaRef ds:uri="http://schemas.microsoft.com/office/infopath/2007/PartnerControls"/>
+    <ds:schemaRef ds:uri="http://schemas.microsoft.com/office/2006/documentManagement/types"/>
+    <ds:schemaRef ds:uri="http://purl.org/dc/elements/1.1/"/>
+    <ds:schemaRef ds:uri="http://www.w3.org/XML/1998/namespace"/>
+  </ds:schemaRefs>
+</ds:datastoreItem>
 </file>
 
-<file path=customXml/item3.xml><?xml version="1.0" encoding="utf-8"?>
-<p:properties xmlns:p="http://schemas.microsoft.com/office/2006/metadata/properties" xmlns:xsi="http://www.w3.org/2001/XMLSchema-instance" xmlns:pc="http://schemas.microsoft.com/office/infopath/2007/PartnerControls">
-  <documentManagement/>
-</p:properties>
+<file path=customXml/itemProps2.xml><?xml version="1.0" encoding="utf-8"?>
+<ds:datastoreItem xmlns:ds="http://schemas.openxmlformats.org/officeDocument/2006/customXml" ds:itemID="{758FDAC0-319D-4A54-8D8E-1D42CB1F8004}">
+  <ds:schemaRefs>
+    <ds:schemaRef ds:uri="http://schemas.microsoft.com/sharepoint/v3/contenttype/forms"/>
+  </ds:schemaRefs>
+</ds:datastoreItem>
 </file>
 
-<file path=customXml/itemProps1.xml><?xml version="1.0" encoding="utf-8"?>
+<file path=customXml/itemProps3.xml><?xml version="1.0" encoding="utf-8"?>
 <ds:datastoreItem xmlns:ds="http://schemas.openxmlformats.org/officeDocument/2006/customXml" ds:itemID="{4C47C6CA-B255-4F53-A8A9-1A4E6D0653D8}">
   <ds:schemaRefs>
     <ds:schemaRef ds:uri="http://schemas.microsoft.com/office/2006/metadata/contentType"/>
@@ -7355,28 +8004,4 @@
     <ds:schemaRef ds:uri="http://schemas.microsoft.com/internal/obd"/>
   </ds:schemaRefs>
 </ds:datastoreItem>
-</file>
-
-<file path=customXml/itemProps2.xml><?xml version="1.0" encoding="utf-8"?>
-<ds:datastoreItem xmlns:ds="http://schemas.openxmlformats.org/officeDocument/2006/customXml" ds:itemID="{758FDAC0-319D-4A54-8D8E-1D42CB1F8004}">
-  <ds:schemaRefs>
-    <ds:schemaRef ds:uri="http://schemas.microsoft.com/sharepoint/v3/contenttype/forms"/>
-  </ds:schemaRefs>
-</ds:datastoreItem>
-</file>
-
-<file path=customXml/itemProps3.xml><?xml version="1.0" encoding="utf-8"?>
-<ds:datastoreItem xmlns:ds="http://schemas.openxmlformats.org/officeDocument/2006/customXml" ds:itemID="{F990F116-B58F-4255-B05B-DA3808E0E5C6}">
-  <ds:schemaRefs>
-    <ds:schemaRef ds:uri="http://schemas.microsoft.com/office/2006/metadata/properties"/>
-    <ds:schemaRef ds:uri="29eeffc7-3a1a-4f16-995c-1b7b58342919"/>
-    <ds:schemaRef ds:uri="http://purl.org/dc/terms/"/>
-    <ds:schemaRef ds:uri="http://schemas.openxmlformats.org/package/2006/metadata/core-properties"/>
-    <ds:schemaRef ds:uri="http://purl.org/dc/dcmitype/"/>
-    <ds:schemaRef ds:uri="http://schemas.microsoft.com/office/infopath/2007/PartnerControls"/>
-    <ds:schemaRef ds:uri="http://schemas.microsoft.com/office/2006/documentManagement/types"/>
-    <ds:schemaRef ds:uri="http://purl.org/dc/elements/1.1/"/>
-    <ds:schemaRef ds:uri="http://www.w3.org/XML/1998/namespace"/>
-  </ds:schemaRefs>
-</ds:datastoreItem>
 </file>
</xml_diff>

<commit_message>
Minor updates to porting session slides
</commit_message>
<xml_diff>
--- a/4-Porting-From-NET-Framework/netcore-workshop-porting.pptx
+++ b/4-Porting-From-NET-Framework/netcore-workshop-porting.pptx
@@ -17,9 +17,9 @@
     <p:sldId id="1395" r:id="rId8"/>
     <p:sldId id="1396" r:id="rId9"/>
     <p:sldId id="1397" r:id="rId10"/>
-    <p:sldId id="1398" r:id="rId11"/>
-    <p:sldId id="1399" r:id="rId12"/>
-    <p:sldId id="1400" r:id="rId13"/>
+    <p:sldId id="1399" r:id="rId11"/>
+    <p:sldId id="1400" r:id="rId12"/>
+    <p:sldId id="1398" r:id="rId13"/>
   </p:sldIdLst>
   <p:sldSz cx="12436475" cy="6994525"/>
   <p:notesSz cx="6858000" cy="9144000"/>
@@ -128,9 +128,9 @@
             <p14:sldId id="1395"/>
             <p14:sldId id="1396"/>
             <p14:sldId id="1397"/>
-            <p14:sldId id="1398"/>
             <p14:sldId id="1399"/>
             <p14:sldId id="1400"/>
+            <p14:sldId id="1398"/>
           </p14:sldIdLst>
         </p14:section>
       </p14:sectionLst>
@@ -262,7 +262,7 @@
               <a:rPr lang="en-US" smtClean="0">
                 <a:latin typeface="Segoe UI" pitchFamily="34" charset="0"/>
               </a:rPr>
-              <a:t>5/9/2017 1:16 PM</a:t>
+              <a:t>9/23/2017 4:57 AM</a:t>
             </a:fld>
             <a:endParaRPr lang="en-US" dirty="0">
               <a:latin typeface="Segoe UI" pitchFamily="34" charset="0"/>
@@ -543,7 +543,7 @@
           <a:p>
             <a:fld id="{38EEC551-8CDA-4EB6-89BB-2A86C9F091C8}" type="datetime8">
               <a:rPr lang="en-US" smtClean="0"/>
-              <a:t>5/9/2017 1:16 PM</a:t>
+              <a:t>9/23/2017 4:53 AM</a:t>
             </a:fld>
             <a:endParaRPr lang="en-US" dirty="0"/>
           </a:p>
@@ -930,7 +930,7 @@
           <a:p>
             <a:fld id="{38EEC551-8CDA-4EB6-89BB-2A86C9F091C8}" type="datetime8">
               <a:rPr lang="en-US" smtClean="0"/>
-              <a:t>5/9/2017 1:16 PM</a:t>
+              <a:t>9/23/2017 4:53 AM</a:t>
             </a:fld>
             <a:endParaRPr lang="en-US" dirty="0"/>
           </a:p>
@@ -1115,7 +1115,7 @@
           <a:p>
             <a:fld id="{38EEC551-8CDA-4EB6-89BB-2A86C9F091C8}" type="datetime8">
               <a:rPr lang="en-US" smtClean="0"/>
-              <a:t>5/9/2017 1:16 PM</a:t>
+              <a:t>9/23/2017 4:53 AM</a:t>
             </a:fld>
             <a:endParaRPr lang="en-US" dirty="0"/>
           </a:p>
@@ -1300,7 +1300,7 @@
           <a:p>
             <a:fld id="{38EEC551-8CDA-4EB6-89BB-2A86C9F091C8}" type="datetime8">
               <a:rPr lang="en-US" smtClean="0"/>
-              <a:t>5/9/2017 1:16 PM</a:t>
+              <a:t>9/23/2017 4:53 AM</a:t>
             </a:fld>
             <a:endParaRPr lang="en-US" dirty="0"/>
           </a:p>
@@ -1485,7 +1485,7 @@
           <a:p>
             <a:fld id="{38EEC551-8CDA-4EB6-89BB-2A86C9F091C8}" type="datetime8">
               <a:rPr lang="en-US" smtClean="0"/>
-              <a:t>5/9/2017 1:16 PM</a:t>
+              <a:t>9/23/2017 4:53 AM</a:t>
             </a:fld>
             <a:endParaRPr lang="en-US" dirty="0"/>
           </a:p>
@@ -1572,7 +1572,44 @@
           <a:bodyPr/>
           <a:lstStyle/>
           <a:p>
-            <a:endParaRPr lang="en-US"/>
+            <a:pPr marL="228600" indent="-228600">
+              <a:buAutoNum type="arabicPeriod"/>
+            </a:pPr>
+            <a:r>
+              <a:rPr lang="en-US" dirty="0"/>
+              <a:t>Create a .NET Framework class library</a:t>
+            </a:r>
+          </a:p>
+          <a:p>
+            <a:pPr marL="228600" indent="-228600">
+              <a:buAutoNum type="arabicPeriod"/>
+            </a:pPr>
+            <a:r>
+              <a:rPr lang="en-US" dirty="0"/>
+              <a:t>Reference the </a:t>
+            </a:r>
+            <a:r>
+              <a:rPr lang="en-US" dirty="0" err="1"/>
+              <a:t>NQuery</a:t>
+            </a:r>
+            <a:r>
+              <a:rPr lang="en-US" dirty="0"/>
+              <a:t> NuGet package from this new library</a:t>
+            </a:r>
+          </a:p>
+          <a:p>
+            <a:pPr marL="228600" indent="-228600">
+              <a:buAutoNum type="arabicPeriod"/>
+            </a:pPr>
+            <a:r>
+              <a:rPr lang="en-US" dirty="0"/>
+              <a:t>Create a new .NET Standard 2.0 class library and copy the class library </a:t>
+            </a:r>
+            <a:r>
+              <a:rPr lang="en-US"/>
+              <a:t>code in</a:t>
+            </a:r>
+            <a:endParaRPr lang="en-US" dirty="0"/>
           </a:p>
         </p:txBody>
       </p:sp>
@@ -1670,7 +1707,7 @@
           <a:p>
             <a:fld id="{38EEC551-8CDA-4EB6-89BB-2A86C9F091C8}" type="datetime8">
               <a:rPr lang="en-US" smtClean="0"/>
-              <a:t>5/9/2017 1:16 PM</a:t>
+              <a:t>9/23/2017 4:53 AM</a:t>
             </a:fld>
             <a:endParaRPr lang="en-US" dirty="0"/>
           </a:p>
@@ -1757,7 +1794,7 @@
           <a:bodyPr/>
           <a:lstStyle/>
           <a:p>
-            <a:endParaRPr lang="en-US"/>
+            <a:endParaRPr lang="en-US" dirty="0"/>
           </a:p>
         </p:txBody>
       </p:sp>
@@ -1855,7 +1892,7 @@
           <a:p>
             <a:fld id="{38EEC551-8CDA-4EB6-89BB-2A86C9F091C8}" type="datetime8">
               <a:rPr lang="en-US" smtClean="0"/>
-              <a:t>5/9/2017 1:16 PM</a:t>
+              <a:t>9/23/2017 4:53 AM</a:t>
             </a:fld>
             <a:endParaRPr lang="en-US" dirty="0"/>
           </a:p>
@@ -1888,7 +1925,7 @@
     </p:spTree>
     <p:extLst>
       <p:ext uri="{BB962C8B-B14F-4D97-AF65-F5344CB8AC3E}">
-        <p14:creationId xmlns:p14="http://schemas.microsoft.com/office/powerpoint/2010/main" val="97638035"/>
+        <p14:creationId xmlns:p14="http://schemas.microsoft.com/office/powerpoint/2010/main" val="293645291"/>
       </p:ext>
     </p:extLst>
   </p:cSld>
@@ -2040,7 +2077,7 @@
           <a:p>
             <a:fld id="{38EEC551-8CDA-4EB6-89BB-2A86C9F091C8}" type="datetime8">
               <a:rPr lang="en-US" smtClean="0"/>
-              <a:t>5/9/2017 1:16 PM</a:t>
+              <a:t>9/23/2017 4:53 AM</a:t>
             </a:fld>
             <a:endParaRPr lang="en-US" dirty="0"/>
           </a:p>
@@ -2073,7 +2110,7 @@
     </p:spTree>
     <p:extLst>
       <p:ext uri="{BB962C8B-B14F-4D97-AF65-F5344CB8AC3E}">
-        <p14:creationId xmlns:p14="http://schemas.microsoft.com/office/powerpoint/2010/main" val="293645291"/>
+        <p14:creationId xmlns:p14="http://schemas.microsoft.com/office/powerpoint/2010/main" val="1662646175"/>
       </p:ext>
     </p:extLst>
   </p:cSld>
@@ -2127,7 +2164,10 @@
           <a:bodyPr/>
           <a:lstStyle/>
           <a:p>
-            <a:endParaRPr lang="en-US" dirty="0"/>
+            <a:r>
+              <a:rPr lang="en-US" dirty="0"/>
+              <a:t>https://docs.microsoft.com/en-us/aspnet/core/migration/proper-to-2x/</a:t>
+            </a:r>
           </a:p>
         </p:txBody>
       </p:sp>
@@ -2225,7 +2265,7 @@
           <a:p>
             <a:fld id="{38EEC551-8CDA-4EB6-89BB-2A86C9F091C8}" type="datetime8">
               <a:rPr lang="en-US" smtClean="0"/>
-              <a:t>5/9/2017 1:26 PM</a:t>
+              <a:t>9/23/2017 4:57 AM</a:t>
             </a:fld>
             <a:endParaRPr lang="en-US" dirty="0"/>
           </a:p>
@@ -2258,7 +2298,7 @@
     </p:spTree>
     <p:extLst>
       <p:ext uri="{BB962C8B-B14F-4D97-AF65-F5344CB8AC3E}">
-        <p14:creationId xmlns:p14="http://schemas.microsoft.com/office/powerpoint/2010/main" val="1662646175"/>
+        <p14:creationId xmlns:p14="http://schemas.microsoft.com/office/powerpoint/2010/main" val="97638035"/>
       </p:ext>
     </p:extLst>
   </p:cSld>
@@ -6309,10 +6349,32 @@
             <p:ph type="title"/>
           </p:nvPr>
         </p:nvSpPr>
+        <p:spPr/>
+        <p:txBody>
+          <a:bodyPr/>
+          <a:lstStyle/>
+          <a:p>
+            <a:r>
+              <a:rPr lang="en-US" dirty="0"/>
+              <a:t>ASP.NET Considerations</a:t>
+            </a:r>
+          </a:p>
+        </p:txBody>
+      </p:sp>
+      <p:sp>
+        <p:nvSpPr>
+          <p:cNvPr id="3" name="Text Placeholder 2"/>
+          <p:cNvSpPr>
+            <a:spLocks noGrp="1"/>
+          </p:cNvSpPr>
+          <p:nvPr>
+            <p:ph type="body" sz="quarter" idx="10"/>
+          </p:nvPr>
+        </p:nvSpPr>
         <p:spPr>
           <a:xfrm>
-            <a:off x="274637" y="2125677"/>
-            <a:ext cx="11978573" cy="2179058"/>
+            <a:off x="274702" y="1211287"/>
+            <a:ext cx="11888787" cy="4665893"/>
           </a:xfrm>
         </p:spPr>
         <p:txBody>
@@ -6320,49 +6382,58 @@
           <a:lstStyle/>
           <a:p>
             <a:r>
-              <a:rPr lang="en-US" dirty="0"/>
-              <a:t>Demo: Porting </a:t>
-            </a:r>
-            <a:r>
-              <a:rPr lang="en-US"/>
-              <a:t>an </a:t>
-            </a:r>
-            <a:br>
-              <a:rPr lang="en-US"/>
-            </a:br>
-            <a:r>
-              <a:rPr lang="en-US"/>
-              <a:t>ASP</a:t>
-            </a:r>
-            <a:r>
-              <a:rPr lang="en-US" dirty="0"/>
-              <a:t>.NET MVC 5 Application</a:t>
-            </a:r>
+              <a:rPr lang="en-US" sz="4000" dirty="0"/>
+              <a:t>Modules / Handlers</a:t>
+            </a:r>
+          </a:p>
+          <a:p>
+            <a:r>
+              <a:rPr lang="en-US" sz="4000" dirty="0"/>
+              <a:t>Startup / Configuration</a:t>
+            </a:r>
+          </a:p>
+          <a:p>
+            <a:r>
+              <a:rPr lang="en-US" sz="4000" dirty="0"/>
+              <a:t>Front-end (static) files</a:t>
+            </a:r>
+          </a:p>
+          <a:p>
+            <a:r>
+              <a:rPr lang="en-US" sz="4000" dirty="0"/>
+              <a:t>Identity</a:t>
+            </a:r>
+          </a:p>
+          <a:p>
+            <a:r>
+              <a:rPr lang="en-US" sz="4000" dirty="0"/>
+              <a:t>Entity Framework (migrations, etc.)</a:t>
+            </a:r>
+          </a:p>
+          <a:p>
+            <a:r>
+              <a:rPr lang="en-US" sz="4000" dirty="0"/>
+              <a:t>Tool: Routing</a:t>
+            </a:r>
+          </a:p>
+          <a:p>
+            <a:endParaRPr lang="en-US" sz="3200" dirty="0"/>
           </a:p>
         </p:txBody>
       </p:sp>
     </p:spTree>
     <p:extLst>
       <p:ext uri="{BB962C8B-B14F-4D97-AF65-F5344CB8AC3E}">
-        <p14:creationId xmlns:p14="http://schemas.microsoft.com/office/powerpoint/2010/main" val="1165692538"/>
+        <p14:creationId xmlns:p14="http://schemas.microsoft.com/office/powerpoint/2010/main" val="2204738350"/>
       </p:ext>
     </p:extLst>
   </p:cSld>
   <p:clrMapOvr>
     <a:masterClrMapping/>
   </p:clrMapOvr>
-  <mc:AlternateContent xmlns:mc="http://schemas.openxmlformats.org/markup-compatibility/2006" xmlns:p14="http://schemas.microsoft.com/office/powerpoint/2010/main">
-    <mc:Choice Requires="p14">
-      <p:transition spd="slow" p14:dur="3400">
-        <p14:reveal/>
-      </p:transition>
-    </mc:Choice>
-    <mc:Fallback xmlns="">
-      <p:transition spd="slow">
-        <p:fade/>
-      </p:transition>
-    </mc:Fallback>
-  </mc:AlternateContent>
+  <p:transition>
+    <p:fade/>
+  </p:transition>
 </p:sld>
 </file>
 
@@ -6400,7 +6471,7 @@
           <a:p>
             <a:r>
               <a:rPr lang="en-US" dirty="0"/>
-              <a:t>ASP.NET Considerations</a:t>
+              <a:t>Steps</a:t>
             </a:r>
           </a:p>
         </p:txBody>
@@ -6418,7 +6489,7 @@
         <p:spPr>
           <a:xfrm>
             <a:off x="274702" y="1211287"/>
-            <a:ext cx="11888787" cy="4665893"/>
+            <a:ext cx="11888787" cy="5343001"/>
           </a:xfrm>
         </p:spPr>
         <p:txBody>
@@ -6427,48 +6498,69 @@
           <a:p>
             <a:r>
               <a:rPr lang="en-US" sz="4000" dirty="0"/>
-              <a:t>Modules / Handlers</a:t>
+              <a:t>Get ready</a:t>
+            </a:r>
+          </a:p>
+          <a:p>
+            <a:pPr lvl="1"/>
+            <a:r>
+              <a:rPr lang="en-US" sz="3200" dirty="0"/>
+              <a:t>Learn with a new / internal application</a:t>
             </a:r>
           </a:p>
           <a:p>
             <a:r>
               <a:rPr lang="en-US" sz="4000" dirty="0"/>
-              <a:t>Startup / Configuration</a:t>
+              <a:t>Prepare Your Existing Application</a:t>
+            </a:r>
+          </a:p>
+          <a:p>
+            <a:pPr lvl="1"/>
+            <a:r>
+              <a:rPr lang="en-US" sz="3200" dirty="0"/>
+              <a:t>Update to new release / patterns</a:t>
+            </a:r>
+          </a:p>
+          <a:p>
+            <a:pPr lvl="1"/>
+            <a:r>
+              <a:rPr lang="en-US" sz="3200" dirty="0"/>
+              <a:t>Refactor to services</a:t>
+            </a:r>
+          </a:p>
+          <a:p>
+            <a:pPr lvl="1"/>
+            <a:r>
+              <a:rPr lang="en-US" sz="3200" dirty="0"/>
+              <a:t>Test coverage (unit, integration, user interface)</a:t>
             </a:r>
           </a:p>
           <a:p>
             <a:r>
               <a:rPr lang="en-US" sz="4000" dirty="0"/>
-              <a:t>Front-end (static) files</a:t>
-            </a:r>
-          </a:p>
-          <a:p>
-            <a:r>
-              <a:rPr lang="en-US" sz="4000" dirty="0"/>
-              <a:t>Identity</a:t>
-            </a:r>
-          </a:p>
-          <a:p>
-            <a:r>
-              <a:rPr lang="en-US" sz="4000" dirty="0"/>
-              <a:t>Entity Framework (migrations, etc.)</a:t>
-            </a:r>
-          </a:p>
-          <a:p>
-            <a:r>
-              <a:rPr lang="en-US" sz="4000" dirty="0"/>
-              <a:t>Tool: Routing</a:t>
-            </a:r>
-          </a:p>
-          <a:p>
-            <a:endParaRPr lang="en-US" sz="3200" dirty="0"/>
+              <a:t>Create a New Application</a:t>
+            </a:r>
+          </a:p>
+          <a:p>
+            <a:pPr lvl="1"/>
+            <a:r>
+              <a:rPr lang="en-US" sz="3200" dirty="0"/>
+              <a:t>Select the nearest match</a:t>
+            </a:r>
+          </a:p>
+          <a:p>
+            <a:pPr lvl="1"/>
+            <a:r>
+              <a:rPr lang="en-US" sz="3200" dirty="0"/>
+              <a:t>Copy / reference code</a:t>
+            </a:r>
           </a:p>
         </p:txBody>
       </p:sp>
     </p:spTree>
     <p:extLst>
       <p:ext uri="{BB962C8B-B14F-4D97-AF65-F5344CB8AC3E}">
-        <p14:creationId xmlns:p14="http://schemas.microsoft.com/office/powerpoint/2010/main" val="2204738350"/>
+        <p14:creationId xmlns:p14="http://schemas.microsoft.com/office/powerpoint/2010/main" val="873442315"/>
       </p:ext>
     </p:extLst>
   </p:cSld>
@@ -6508,32 +6600,10 @@
             <p:ph type="title"/>
           </p:nvPr>
         </p:nvSpPr>
-        <p:spPr/>
-        <p:txBody>
-          <a:bodyPr/>
-          <a:lstStyle/>
-          <a:p>
-            <a:r>
-              <a:rPr lang="en-US" dirty="0"/>
-              <a:t>Steps</a:t>
-            </a:r>
-          </a:p>
-        </p:txBody>
-      </p:sp>
-      <p:sp>
-        <p:nvSpPr>
-          <p:cNvPr id="3" name="Text Placeholder 2"/>
-          <p:cNvSpPr>
-            <a:spLocks noGrp="1"/>
-          </p:cNvSpPr>
-          <p:nvPr>
-            <p:ph type="body" sz="quarter" idx="10"/>
-          </p:nvPr>
-        </p:nvSpPr>
         <p:spPr>
           <a:xfrm>
-            <a:off x="274702" y="1211287"/>
-            <a:ext cx="11888787" cy="5343001"/>
+            <a:off x="274637" y="2125677"/>
+            <a:ext cx="11978573" cy="2179058"/>
           </a:xfrm>
         </p:spPr>
         <p:txBody>
@@ -6541,62 +6611,15 @@
           <a:lstStyle/>
           <a:p>
             <a:r>
-              <a:rPr lang="en-US" sz="4000" dirty="0"/>
-              <a:t>Get ready</a:t>
-            </a:r>
-          </a:p>
-          <a:p>
-            <a:pPr lvl="1"/>
-            <a:r>
-              <a:rPr lang="en-US" sz="3200" dirty="0"/>
-              <a:t>Learn with a new / internal application</a:t>
-            </a:r>
-          </a:p>
-          <a:p>
-            <a:r>
-              <a:rPr lang="en-US" sz="4000" dirty="0"/>
-              <a:t>Prepare Your Existing Application</a:t>
-            </a:r>
-          </a:p>
-          <a:p>
-            <a:pPr lvl="1"/>
-            <a:r>
-              <a:rPr lang="en-US" sz="3200" dirty="0"/>
-              <a:t>Update to new release / patterns</a:t>
-            </a:r>
-          </a:p>
-          <a:p>
-            <a:pPr lvl="1"/>
-            <a:r>
-              <a:rPr lang="en-US" sz="3200" dirty="0"/>
-              <a:t>Refactor to services</a:t>
-            </a:r>
-          </a:p>
-          <a:p>
-            <a:pPr lvl="1"/>
-            <a:r>
-              <a:rPr lang="en-US" sz="3200" dirty="0"/>
-              <a:t>Test coverage (unit, integration, user interface)</a:t>
-            </a:r>
-          </a:p>
-          <a:p>
-            <a:r>
-              <a:rPr lang="en-US" sz="4000" dirty="0"/>
-              <a:t>Create a New Application</a:t>
-            </a:r>
-          </a:p>
-          <a:p>
-            <a:pPr lvl="1"/>
-            <a:r>
-              <a:rPr lang="en-US" sz="3200" dirty="0"/>
-              <a:t>Select the nearest match</a:t>
-            </a:r>
-          </a:p>
-          <a:p>
-            <a:pPr lvl="1"/>
-            <a:r>
-              <a:rPr lang="en-US" sz="3200" dirty="0"/>
-              <a:t>Copy / reference code</a:t>
+              <a:rPr lang="en-US" dirty="0"/>
+              <a:t>Lab: Porting an </a:t>
+            </a:r>
+            <a:br>
+              <a:rPr lang="en-US" dirty="0"/>
+            </a:br>
+            <a:r>
+              <a:rPr lang="en-US" dirty="0"/>
+              <a:t>ASP.NET MVC 5 Application</a:t>
             </a:r>
           </a:p>
         </p:txBody>
@@ -6604,16 +6627,25 @@
     </p:spTree>
     <p:extLst>
       <p:ext uri="{BB962C8B-B14F-4D97-AF65-F5344CB8AC3E}">
-        <p14:creationId xmlns:p14="http://schemas.microsoft.com/office/powerpoint/2010/main" val="873442315"/>
+        <p14:creationId xmlns:p14="http://schemas.microsoft.com/office/powerpoint/2010/main" val="1165692538"/>
       </p:ext>
     </p:extLst>
   </p:cSld>
   <p:clrMapOvr>
     <a:masterClrMapping/>
   </p:clrMapOvr>
-  <p:transition>
-    <p:fade/>
-  </p:transition>
+  <mc:AlternateContent xmlns:mc="http://schemas.openxmlformats.org/markup-compatibility/2006" xmlns:p14="http://schemas.microsoft.com/office/powerpoint/2010/main">
+    <mc:Choice Requires="p14">
+      <p:transition spd="slow" p14:dur="3400">
+        <p14:reveal/>
+      </p:transition>
+    </mc:Choice>
+    <mc:Fallback xmlns="">
+      <p:transition spd="slow">
+        <p:fade/>
+      </p:transition>
+    </mc:Fallback>
+  </mc:AlternateContent>
 </p:sld>
 </file>
 
@@ -7788,21 +7820,6 @@
 </file>
 
 <file path=customXml/item1.xml><?xml version="1.0" encoding="utf-8"?>
-<p:properties xmlns:p="http://schemas.microsoft.com/office/2006/metadata/properties" xmlns:xsi="http://www.w3.org/2001/XMLSchema-instance" xmlns:pc="http://schemas.microsoft.com/office/infopath/2007/PartnerControls">
-  <documentManagement/>
-</p:properties>
-</file>
-
-<file path=customXml/item2.xml><?xml version="1.0" encoding="utf-8"?>
-<?mso-contentType ?>
-<FormTemplates xmlns="http://schemas.microsoft.com/sharepoint/v3/contenttype/forms">
-  <Display>DocumentLibraryForm</Display>
-  <Edit>DocumentLibraryForm</Edit>
-  <New>DocumentLibraryForm</New>
-</FormTemplates>
-</file>
-
-<file path=customXml/item3.xml><?xml version="1.0" encoding="utf-8"?>
 <ct:contentTypeSchema xmlns:ct="http://schemas.microsoft.com/office/2006/metadata/contentType" xmlns:ma="http://schemas.microsoft.com/office/2006/metadata/properties/metaAttributes" ct:_="" ma:_="" ma:contentTypeName="Document" ma:contentTypeID="0x0101004C8AF336095DB84A94AB1A4B939C0475" ma:contentTypeVersion="4" ma:contentTypeDescription="Create a new document." ma:contentTypeScope="" ma:versionID="6f8327450122d2e4aedd139501eaa58b">
   <xsd:schema xmlns:xsd="http://www.w3.org/2001/XMLSchema" xmlns:xs="http://www.w3.org/2001/XMLSchema" xmlns:p="http://schemas.microsoft.com/office/2006/metadata/properties" xmlns:ns2="29eeffc7-3a1a-4f16-995c-1b7b58342919" targetNamespace="http://schemas.microsoft.com/office/2006/metadata/properties" ma:root="true" ma:fieldsID="7d6c3be25c216b690a82d24b3f2244b5" ns2:_="">
     <xsd:import namespace="29eeffc7-3a1a-4f16-995c-1b7b58342919"/>
@@ -7964,31 +7981,22 @@
 </ct:contentTypeSchema>
 </file>
 
-<file path=customXml/itemProps1.xml><?xml version="1.0" encoding="utf-8"?>
-<ds:datastoreItem xmlns:ds="http://schemas.openxmlformats.org/officeDocument/2006/customXml" ds:itemID="{F990F116-B58F-4255-B05B-DA3808E0E5C6}">
-  <ds:schemaRefs>
-    <ds:schemaRef ds:uri="http://schemas.microsoft.com/office/2006/metadata/properties"/>
-    <ds:schemaRef ds:uri="29eeffc7-3a1a-4f16-995c-1b7b58342919"/>
-    <ds:schemaRef ds:uri="http://purl.org/dc/terms/"/>
-    <ds:schemaRef ds:uri="http://schemas.openxmlformats.org/package/2006/metadata/core-properties"/>
-    <ds:schemaRef ds:uri="http://purl.org/dc/dcmitype/"/>
-    <ds:schemaRef ds:uri="http://schemas.microsoft.com/office/infopath/2007/PartnerControls"/>
-    <ds:schemaRef ds:uri="http://schemas.microsoft.com/office/2006/documentManagement/types"/>
-    <ds:schemaRef ds:uri="http://purl.org/dc/elements/1.1/"/>
-    <ds:schemaRef ds:uri="http://www.w3.org/XML/1998/namespace"/>
-  </ds:schemaRefs>
-</ds:datastoreItem>
+<file path=customXml/item2.xml><?xml version="1.0" encoding="utf-8"?>
+<?mso-contentType ?>
+<FormTemplates xmlns="http://schemas.microsoft.com/sharepoint/v3/contenttype/forms">
+  <Display>DocumentLibraryForm</Display>
+  <Edit>DocumentLibraryForm</Edit>
+  <New>DocumentLibraryForm</New>
+</FormTemplates>
 </file>
 
-<file path=customXml/itemProps2.xml><?xml version="1.0" encoding="utf-8"?>
-<ds:datastoreItem xmlns:ds="http://schemas.openxmlformats.org/officeDocument/2006/customXml" ds:itemID="{758FDAC0-319D-4A54-8D8E-1D42CB1F8004}">
-  <ds:schemaRefs>
-    <ds:schemaRef ds:uri="http://schemas.microsoft.com/sharepoint/v3/contenttype/forms"/>
-  </ds:schemaRefs>
-</ds:datastoreItem>
+<file path=customXml/item3.xml><?xml version="1.0" encoding="utf-8"?>
+<p:properties xmlns:p="http://schemas.microsoft.com/office/2006/metadata/properties" xmlns:xsi="http://www.w3.org/2001/XMLSchema-instance" xmlns:pc="http://schemas.microsoft.com/office/infopath/2007/PartnerControls">
+  <documentManagement/>
+</p:properties>
 </file>
 
-<file path=customXml/itemProps3.xml><?xml version="1.0" encoding="utf-8"?>
+<file path=customXml/itemProps1.xml><?xml version="1.0" encoding="utf-8"?>
 <ds:datastoreItem xmlns:ds="http://schemas.openxmlformats.org/officeDocument/2006/customXml" ds:itemID="{4C47C6CA-B255-4F53-A8A9-1A4E6D0653D8}">
   <ds:schemaRefs>
     <ds:schemaRef ds:uri="http://schemas.microsoft.com/office/2006/metadata/contentType"/>
@@ -8004,4 +8012,28 @@
     <ds:schemaRef ds:uri="http://schemas.microsoft.com/internal/obd"/>
   </ds:schemaRefs>
 </ds:datastoreItem>
+</file>
+
+<file path=customXml/itemProps2.xml><?xml version="1.0" encoding="utf-8"?>
+<ds:datastoreItem xmlns:ds="http://schemas.openxmlformats.org/officeDocument/2006/customXml" ds:itemID="{758FDAC0-319D-4A54-8D8E-1D42CB1F8004}">
+  <ds:schemaRefs>
+    <ds:schemaRef ds:uri="http://schemas.microsoft.com/sharepoint/v3/contenttype/forms"/>
+  </ds:schemaRefs>
+</ds:datastoreItem>
+</file>
+
+<file path=customXml/itemProps3.xml><?xml version="1.0" encoding="utf-8"?>
+<ds:datastoreItem xmlns:ds="http://schemas.openxmlformats.org/officeDocument/2006/customXml" ds:itemID="{F990F116-B58F-4255-B05B-DA3808E0E5C6}">
+  <ds:schemaRefs>
+    <ds:schemaRef ds:uri="http://schemas.microsoft.com/office/2006/metadata/properties"/>
+    <ds:schemaRef ds:uri="29eeffc7-3a1a-4f16-995c-1b7b58342919"/>
+    <ds:schemaRef ds:uri="http://purl.org/dc/terms/"/>
+    <ds:schemaRef ds:uri="http://schemas.openxmlformats.org/package/2006/metadata/core-properties"/>
+    <ds:schemaRef ds:uri="http://purl.org/dc/dcmitype/"/>
+    <ds:schemaRef ds:uri="http://schemas.microsoft.com/office/infopath/2007/PartnerControls"/>
+    <ds:schemaRef ds:uri="http://schemas.microsoft.com/office/2006/documentManagement/types"/>
+    <ds:schemaRef ds:uri="http://purl.org/dc/elements/1.1/"/>
+    <ds:schemaRef ds:uri="http://www.w3.org/XML/1998/namespace"/>
+  </ds:schemaRefs>
+</ds:datastoreItem>
 </file>
</xml_diff>